<commit_message>
Updated the proposal to match the new effort
</commit_message>
<xml_diff>
--- a/Project_2/Proposal/Project_2.pptx
+++ b/Project_2/Proposal/Project_2.pptx
@@ -8,8 +8,10 @@
     <p:sldId id="256" r:id="rId2"/>
     <p:sldId id="257" r:id="rId3"/>
     <p:sldId id="258" r:id="rId4"/>
-    <p:sldId id="259" r:id="rId5"/>
-    <p:sldId id="260" r:id="rId6"/>
+    <p:sldId id="261" r:id="rId5"/>
+    <p:sldId id="262" r:id="rId6"/>
+    <p:sldId id="263" r:id="rId7"/>
+    <p:sldId id="260" r:id="rId8"/>
   </p:sldIdLst>
   <p:sldSz cx="12192000" cy="6858000"/>
   <p:notesSz cx="6858000" cy="9144000"/>
@@ -108,6 +110,11 @@
       </a:defRPr>
     </a:lvl9pPr>
   </p:defaultTextStyle>
+  <p:extLst>
+    <p:ext uri="{EFAFB233-063F-42B5-8137-9DF3F51BA10A}">
+      <p15:sldGuideLst xmlns:p15="http://schemas.microsoft.com/office/powerpoint/2012/main"/>
+    </p:ext>
+  </p:extLst>
 </p:presentation>
 </file>
 
@@ -263,7 +270,7 @@
           <a:p>
             <a:fld id="{0F5A3BCA-4533-4E9F-ABC5-2FF45025BA53}" type="datetimeFigureOut">
               <a:rPr lang="en-US" smtClean="0"/>
-              <a:t>10/20/2018</a:t>
+              <a:t>12/29/2018</a:t>
             </a:fld>
             <a:endParaRPr lang="en-US"/>
           </a:p>
@@ -461,7 +468,7 @@
           <a:p>
             <a:fld id="{0F5A3BCA-4533-4E9F-ABC5-2FF45025BA53}" type="datetimeFigureOut">
               <a:rPr lang="en-US" smtClean="0"/>
-              <a:t>10/20/2018</a:t>
+              <a:t>12/29/2018</a:t>
             </a:fld>
             <a:endParaRPr lang="en-US"/>
           </a:p>
@@ -669,7 +676,7 @@
           <a:p>
             <a:fld id="{0F5A3BCA-4533-4E9F-ABC5-2FF45025BA53}" type="datetimeFigureOut">
               <a:rPr lang="en-US" smtClean="0"/>
-              <a:t>10/20/2018</a:t>
+              <a:t>12/29/2018</a:t>
             </a:fld>
             <a:endParaRPr lang="en-US"/>
           </a:p>
@@ -909,7 +916,7 @@
           <a:p>
             <a:fld id="{0F5A3BCA-4533-4E9F-ABC5-2FF45025BA53}" type="datetimeFigureOut">
               <a:rPr lang="en-US" smtClean="0"/>
-              <a:t>10/20/2018</a:t>
+              <a:t>12/29/2018</a:t>
             </a:fld>
             <a:endParaRPr lang="en-US"/>
           </a:p>
@@ -1184,7 +1191,7 @@
           <a:p>
             <a:fld id="{0F5A3BCA-4533-4E9F-ABC5-2FF45025BA53}" type="datetimeFigureOut">
               <a:rPr lang="en-US" smtClean="0"/>
-              <a:t>10/20/2018</a:t>
+              <a:t>12/29/2018</a:t>
             </a:fld>
             <a:endParaRPr lang="en-US"/>
           </a:p>
@@ -1449,7 +1456,7 @@
           <a:p>
             <a:fld id="{0F5A3BCA-4533-4E9F-ABC5-2FF45025BA53}" type="datetimeFigureOut">
               <a:rPr lang="en-US" smtClean="0"/>
-              <a:t>10/20/2018</a:t>
+              <a:t>12/29/2018</a:t>
             </a:fld>
             <a:endParaRPr lang="en-US"/>
           </a:p>
@@ -1861,7 +1868,7 @@
           <a:p>
             <a:fld id="{0F5A3BCA-4533-4E9F-ABC5-2FF45025BA53}" type="datetimeFigureOut">
               <a:rPr lang="en-US" smtClean="0"/>
-              <a:t>10/20/2018</a:t>
+              <a:t>12/29/2018</a:t>
             </a:fld>
             <a:endParaRPr lang="en-US"/>
           </a:p>
@@ -2002,7 +2009,7 @@
           <a:p>
             <a:fld id="{0F5A3BCA-4533-4E9F-ABC5-2FF45025BA53}" type="datetimeFigureOut">
               <a:rPr lang="en-US" smtClean="0"/>
-              <a:t>10/20/2018</a:t>
+              <a:t>12/29/2018</a:t>
             </a:fld>
             <a:endParaRPr lang="en-US"/>
           </a:p>
@@ -2115,7 +2122,7 @@
           <a:p>
             <a:fld id="{0F5A3BCA-4533-4E9F-ABC5-2FF45025BA53}" type="datetimeFigureOut">
               <a:rPr lang="en-US" smtClean="0"/>
-              <a:t>10/20/2018</a:t>
+              <a:t>12/29/2018</a:t>
             </a:fld>
             <a:endParaRPr lang="en-US"/>
           </a:p>
@@ -2426,7 +2433,7 @@
           <a:p>
             <a:fld id="{0F5A3BCA-4533-4E9F-ABC5-2FF45025BA53}" type="datetimeFigureOut">
               <a:rPr lang="en-US" smtClean="0"/>
-              <a:t>10/20/2018</a:t>
+              <a:t>12/29/2018</a:t>
             </a:fld>
             <a:endParaRPr lang="en-US"/>
           </a:p>
@@ -2714,7 +2721,7 @@
           <a:p>
             <a:fld id="{0F5A3BCA-4533-4E9F-ABC5-2FF45025BA53}" type="datetimeFigureOut">
               <a:rPr lang="en-US" smtClean="0"/>
-              <a:t>10/20/2018</a:t>
+              <a:t>12/29/2018</a:t>
             </a:fld>
             <a:endParaRPr lang="en-US"/>
           </a:p>
@@ -2955,7 +2962,7 @@
           <a:p>
             <a:fld id="{0F5A3BCA-4533-4E9F-ABC5-2FF45025BA53}" type="datetimeFigureOut">
               <a:rPr lang="en-US" smtClean="0"/>
-              <a:t>10/20/2018</a:t>
+              <a:t>12/29/2018</a:t>
             </a:fld>
             <a:endParaRPr lang="en-US"/>
           </a:p>
@@ -3418,20 +3425,31 @@
         </p:nvSpPr>
         <p:spPr/>
         <p:txBody>
-          <a:bodyPr/>
-          <a:lstStyle/>
-          <a:p>
-            <a:r>
-              <a:rPr lang="en-US" dirty="0"/>
+          <a:bodyPr>
+            <a:normAutofit/>
+          </a:bodyPr>
+          <a:lstStyle/>
+          <a:p>
+            <a:r>
+              <a:rPr lang="en-US" sz="3600" dirty="0">
+                <a:latin typeface="Segoe UI Semilight" panose="020B0402040204020203" pitchFamily="34" charset="0"/>
+                <a:cs typeface="Segoe UI Semilight" panose="020B0402040204020203" pitchFamily="34" charset="0"/>
+              </a:rPr>
               <a:t>Project – 2</a:t>
             </a:r>
           </a:p>
           <a:p>
             <a:r>
-              <a:rPr lang="en-US" dirty="0" err="1"/>
+              <a:rPr lang="en-US" sz="3600" dirty="0" err="1">
+                <a:latin typeface="Segoe UI Semilight" panose="020B0402040204020203" pitchFamily="34" charset="0"/>
+                <a:cs typeface="Segoe UI Semilight" panose="020B0402040204020203" pitchFamily="34" charset="0"/>
+              </a:rPr>
               <a:t>Madhukara</a:t>
             </a:r>
-            <a:endParaRPr lang="en-US" dirty="0"/>
+            <a:endParaRPr lang="en-US" sz="3600" dirty="0">
+              <a:latin typeface="Segoe UI Semilight" panose="020B0402040204020203" pitchFamily="34" charset="0"/>
+              <a:cs typeface="Segoe UI Semilight" panose="020B0402040204020203" pitchFamily="34" charset="0"/>
+            </a:endParaRPr>
           </a:p>
         </p:txBody>
       </p:sp>
@@ -3536,9 +3554,10 @@
           <a:p>
             <a:pPr algn="ctr"/>
             <a:r>
-              <a:rPr lang="en-US" dirty="0"/>
-              <a:t>MongoDB</a:t>
-            </a:r>
+              <a:rPr lang="en-US" dirty="0" err="1"/>
+              <a:t>SqliteDB</a:t>
+            </a:r>
+            <a:endParaRPr lang="en-US" dirty="0"/>
           </a:p>
         </p:txBody>
       </p:sp>
@@ -3686,13 +3705,18 @@
           <a:p>
             <a:pPr algn="ctr"/>
             <a:r>
-              <a:rPr lang="en-US" dirty="0">
+              <a:rPr lang="en-US" dirty="0" err="1">
                 <a:solidFill>
                   <a:schemeClr val="tx1"/>
                 </a:solidFill>
               </a:rPr>
-              <a:t>Python</a:t>
-            </a:r>
+              <a:t>SqlAlchemy</a:t>
+            </a:r>
+            <a:endParaRPr lang="en-US" dirty="0">
+              <a:solidFill>
+                <a:schemeClr val="tx1"/>
+              </a:solidFill>
+            </a:endParaRPr>
           </a:p>
         </p:txBody>
       </p:sp>
@@ -3710,8 +3734,8 @@
         </p:nvSpPr>
         <p:spPr>
           <a:xfrm>
-            <a:off x="8991600" y="4276725"/>
-            <a:ext cx="2138363" cy="928688"/>
+            <a:off x="8991599" y="5082872"/>
+            <a:ext cx="2138363" cy="812007"/>
           </a:xfrm>
           <a:prstGeom prst="rect">
             <a:avLst/>
@@ -3750,7 +3774,7 @@
                   <a:schemeClr val="tx1"/>
                 </a:solidFill>
               </a:rPr>
-              <a:t>Web</a:t>
+              <a:t>Analyzed plots on browser</a:t>
             </a:r>
           </a:p>
         </p:txBody>
@@ -3917,23 +3941,18 @@
                   <a:schemeClr val="tx1"/>
                 </a:solidFill>
               </a:rPr>
-              <a:t>D3JS </a:t>
-            </a:r>
-            <a:r>
-              <a:rPr lang="en-US" dirty="0" err="1">
-                <a:solidFill>
-                  <a:schemeClr val="tx1"/>
-                </a:solidFill>
-              </a:rPr>
-              <a:t>EventDrop</a:t>
-            </a:r>
+              <a:t>D3.JS</a:t>
+            </a:r>
+          </a:p>
+          <a:p>
+            <a:pPr algn="ctr"/>
             <a:r>
               <a:rPr lang="en-US" dirty="0">
                 <a:solidFill>
                   <a:schemeClr val="tx1"/>
                 </a:solidFill>
               </a:rPr>
-              <a:t> library</a:t>
+              <a:t>JSON</a:t>
             </a:r>
           </a:p>
         </p:txBody>
@@ -3953,7 +3972,7 @@
         <p:spPr>
           <a:xfrm>
             <a:off x="1245430" y="2820589"/>
-            <a:ext cx="926407" cy="400110"/>
+            <a:ext cx="768608" cy="400110"/>
           </a:xfrm>
           <a:prstGeom prst="rect">
             <a:avLst/>
@@ -3967,9 +3986,10 @@
           <a:lstStyle/>
           <a:p>
             <a:r>
-              <a:rPr lang="en-US" sz="2000" dirty="0"/>
-              <a:t>Python</a:t>
-            </a:r>
+              <a:rPr lang="en-US" sz="2000" dirty="0" err="1"/>
+              <a:t>Sqlite</a:t>
+            </a:r>
+            <a:endParaRPr lang="en-US" sz="2000" dirty="0"/>
           </a:p>
         </p:txBody>
       </p:sp>
@@ -4033,7 +4053,7 @@
         </p:nvSpPr>
         <p:spPr>
           <a:xfrm>
-            <a:off x="3988630" y="5205412"/>
+            <a:off x="4118509" y="3064608"/>
             <a:ext cx="854593" cy="400110"/>
           </a:xfrm>
           <a:prstGeom prst="rect">
@@ -4048,7 +4068,11 @@
           <a:lstStyle/>
           <a:p>
             <a:r>
-              <a:rPr lang="en-US" sz="2000" dirty="0"/>
+              <a:rPr lang="en-US" sz="2000" dirty="0">
+                <a:solidFill>
+                  <a:srgbClr val="FF0000"/>
+                </a:solidFill>
+              </a:rPr>
               <a:t>Server</a:t>
             </a:r>
           </a:p>
@@ -4068,7 +4092,7 @@
         </p:nvSpPr>
         <p:spPr>
           <a:xfrm>
-            <a:off x="9633484" y="5205412"/>
+            <a:off x="9667468" y="2974577"/>
             <a:ext cx="786626" cy="400110"/>
           </a:xfrm>
           <a:prstGeom prst="rect">
@@ -4083,8 +4107,95 @@
           <a:lstStyle/>
           <a:p>
             <a:r>
-              <a:rPr lang="en-US" sz="2000" dirty="0"/>
+              <a:rPr lang="en-US" sz="2000" dirty="0">
+                <a:solidFill>
+                  <a:srgbClr val="FF0000"/>
+                </a:solidFill>
+              </a:rPr>
               <a:t>Client</a:t>
+            </a:r>
+          </a:p>
+        </p:txBody>
+      </p:sp>
+      <p:sp>
+        <p:nvSpPr>
+          <p:cNvPr id="25" name="Rectangle 24">
+            <a:extLst>
+              <a:ext uri="{FF2B5EF4-FFF2-40B4-BE49-F238E27FC236}">
+                <a16:creationId xmlns:a16="http://schemas.microsoft.com/office/drawing/2014/main" id="{C91003AE-7780-4637-BEE0-ADA31761A536}"/>
+              </a:ext>
+            </a:extLst>
+          </p:cNvPr>
+          <p:cNvSpPr/>
+          <p:nvPr/>
+        </p:nvSpPr>
+        <p:spPr>
+          <a:xfrm>
+            <a:off x="8991600" y="4276725"/>
+            <a:ext cx="2138363" cy="812007"/>
+          </a:xfrm>
+          <a:prstGeom prst="rect">
+            <a:avLst/>
+          </a:prstGeom>
+          <a:solidFill>
+            <a:schemeClr val="accent1">
+              <a:lumMod val="40000"/>
+              <a:lumOff val="60000"/>
+            </a:schemeClr>
+          </a:solidFill>
+        </p:spPr>
+        <p:style>
+          <a:lnRef idx="2">
+            <a:schemeClr val="accent1">
+              <a:shade val="50000"/>
+            </a:schemeClr>
+          </a:lnRef>
+          <a:fillRef idx="1">
+            <a:schemeClr val="accent1"/>
+          </a:fillRef>
+          <a:effectRef idx="0">
+            <a:schemeClr val="accent1"/>
+          </a:effectRef>
+          <a:fontRef idx="minor">
+            <a:schemeClr val="lt1"/>
+          </a:fontRef>
+        </p:style>
+        <p:txBody>
+          <a:bodyPr rtlCol="0" anchor="ctr"/>
+          <a:lstStyle/>
+          <a:p>
+            <a:pPr algn="ctr"/>
+            <a:r>
+              <a:rPr lang="en-US" dirty="0">
+                <a:solidFill>
+                  <a:schemeClr val="tx1"/>
+                </a:solidFill>
+              </a:rPr>
+              <a:t>D3JS </a:t>
+            </a:r>
+            <a:r>
+              <a:rPr lang="en-US" dirty="0" err="1">
+                <a:solidFill>
+                  <a:schemeClr val="tx1"/>
+                </a:solidFill>
+              </a:rPr>
+              <a:t>TechAn</a:t>
+            </a:r>
+            <a:endParaRPr lang="en-US" dirty="0">
+              <a:solidFill>
+                <a:schemeClr val="tx1"/>
+              </a:solidFill>
+            </a:endParaRPr>
+          </a:p>
+          <a:p>
+            <a:pPr algn="ctr"/>
+            <a:r>
+              <a:rPr lang="en-US" dirty="0">
+                <a:solidFill>
+                  <a:schemeClr val="tx1"/>
+                </a:solidFill>
+              </a:rPr>
+              <a:t>library</a:t>
             </a:r>
           </a:p>
         </p:txBody>
@@ -4165,72 +4276,73 @@
         </p:nvSpPr>
         <p:spPr/>
         <p:txBody>
-          <a:bodyPr/>
-          <a:lstStyle/>
-          <a:p>
-            <a:r>
-              <a:rPr lang="sv-SE" dirty="0"/>
-              <a:t>&lt;time&gt; &lt;tag1&gt; [&lt;tag2&gt; ... &lt;tagn&gt;] &lt;Formatted string&gt;</a:t>
-            </a:r>
-          </a:p>
-          <a:p>
-            <a:endParaRPr lang="sv-SE" dirty="0"/>
-          </a:p>
-          <a:p>
-            <a:r>
-              <a:rPr lang="sv-SE" dirty="0"/>
+          <a:bodyPr>
+            <a:normAutofit/>
+          </a:bodyPr>
+          <a:lstStyle/>
+          <a:p>
+            <a:r>
+              <a:rPr lang="sv-SE" sz="1400" dirty="0"/>
+              <a:t>&lt;id&gt; &lt;Date&gt; &lt;Open&gt;&lt;High&gt;&lt;Low&gt;&lt;Close&gt;&lt;Volume&gt;</a:t>
+            </a:r>
+          </a:p>
+          <a:p>
+            <a:endParaRPr lang="sv-SE" sz="1400" dirty="0"/>
+          </a:p>
+          <a:p>
+            <a:r>
+              <a:rPr lang="sv-SE" sz="1400" dirty="0"/>
               <a:t>Sample</a:t>
             </a:r>
           </a:p>
           <a:p>
             <a:pPr lvl="1"/>
             <a:r>
-              <a:rPr lang="sv-SE" dirty="0"/>
-              <a:t>21:35:10.310 &lt;Bootstrap&gt; Initialize media application</a:t>
+              <a:rPr lang="en-US" sz="1400" dirty="0"/>
+              <a:t>id	Date	Open	High	Low	Close	Volume</a:t>
             </a:r>
           </a:p>
           <a:p>
             <a:pPr lvl="1"/>
             <a:r>
-              <a:rPr lang="sv-SE" dirty="0"/>
-              <a:t>21:35:10.310 &lt;Bootstrap&gt; Media application initialized appID=01</a:t>
+              <a:rPr lang="en-US" sz="1400" dirty="0"/>
+              <a:t>1	12/27/2017	170.100006	170.779999	169.710007	170.600006	21498200</a:t>
             </a:r>
           </a:p>
           <a:p>
             <a:pPr lvl="1"/>
             <a:r>
-              <a:rPr lang="sv-SE" dirty="0"/>
-              <a:t>21:35:10.311 &lt;Stream&gt; Create media stream – audio</a:t>
+              <a:rPr lang="en-US" sz="1400" dirty="0"/>
+              <a:t>2	12/28/2017	171	171.850006	170.479996	171.080002	16480200</a:t>
             </a:r>
           </a:p>
           <a:p>
             <a:pPr lvl="1"/>
             <a:r>
-              <a:rPr lang="sv-SE" dirty="0"/>
-              <a:t>21:35:10.312 &lt;media&gt;&lt;Stream&gt; Media stream audio created</a:t>
+              <a:rPr lang="en-US" sz="1400" dirty="0"/>
+              <a:t>3	12/29/2017	170.520004	170.589996	169.220001	169.229996	25884400</a:t>
             </a:r>
           </a:p>
           <a:p>
             <a:pPr lvl="1"/>
             <a:r>
-              <a:rPr lang="sv-SE" dirty="0"/>
-              <a:t>21:35:10.313 &lt;media&gt;&lt;Codec&gt; Initialize audio codec</a:t>
+              <a:rPr lang="en-US" sz="1400" dirty="0"/>
+              <a:t>4	1/2/2018	170.160004	172.300003	169.259995	172.259995	25555900</a:t>
             </a:r>
           </a:p>
           <a:p>
             <a:pPr lvl="1"/>
             <a:r>
-              <a:rPr lang="sv-SE" dirty="0"/>
-              <a:t>21:35:10.314 &lt;media&gt;&lt;Codec&gt; Configure audio codec – AMR</a:t>
+              <a:rPr lang="en-US" sz="1400" dirty="0"/>
+              <a:t>5	1/3/2018	172.529999	174.550003	171.960007	172.229996	29517900</a:t>
             </a:r>
           </a:p>
           <a:p>
             <a:pPr lvl="1"/>
             <a:r>
-              <a:rPr lang="sv-SE" dirty="0"/>
-              <a:t>21:35:10.315 &lt;media&gt;&lt;Codec&gt; AMR audio codec configured</a:t>
-            </a:r>
-            <a:endParaRPr lang="en-US" dirty="0"/>
+              <a:rPr lang="en-US" sz="1400" dirty="0"/>
+              <a:t>6	1/4/2018	172.539993	173.470001	172.080002	173.029999	22434600</a:t>
+            </a:r>
           </a:p>
         </p:txBody>
       </p:sp>
@@ -4269,7 +4381,7 @@
           <p:cNvPr id="2" name="Title 1">
             <a:extLst>
               <a:ext uri="{FF2B5EF4-FFF2-40B4-BE49-F238E27FC236}">
-                <a16:creationId xmlns:a16="http://schemas.microsoft.com/office/drawing/2014/main" id="{FB1D0C41-FE6F-4B80-B51F-B04EF70D7C90}"/>
+                <a16:creationId xmlns:a16="http://schemas.microsoft.com/office/drawing/2014/main" id="{B3E7E930-7F32-44AC-9E53-A26997E9595C}"/>
               </a:ext>
             </a:extLst>
           </p:cNvPr>
@@ -4287,62 +4399,47 @@
           <a:p>
             <a:r>
               <a:rPr lang="en-US" dirty="0"/>
-              <a:t>Planned Output</a:t>
+              <a:t>Visualization - 1</a:t>
             </a:r>
           </a:p>
         </p:txBody>
       </p:sp>
       <p:pic>
         <p:nvPicPr>
-          <p:cNvPr id="1026" name="Picture 2" descr="EventDrops example">
-            <a:extLst>
-              <a:ext uri="{FF2B5EF4-FFF2-40B4-BE49-F238E27FC236}">
-                <a16:creationId xmlns:a16="http://schemas.microsoft.com/office/drawing/2014/main" id="{F011BAF1-A2AF-4AC2-8CA8-875652C77AC9}"/>
+          <p:cNvPr id="7" name="Content Placeholder 6">
+            <a:extLst>
+              <a:ext uri="{FF2B5EF4-FFF2-40B4-BE49-F238E27FC236}">
+                <a16:creationId xmlns:a16="http://schemas.microsoft.com/office/drawing/2014/main" id="{CA49EA47-A1E5-4496-BDEC-1F5221916690}"/>
               </a:ext>
             </a:extLst>
           </p:cNvPr>
           <p:cNvPicPr>
-            <a:picLocks noChangeAspect="1" noChangeArrowheads="1" noCrop="1"/>
+            <a:picLocks noGrp="1" noChangeAspect="1"/>
           </p:cNvPicPr>
-          <p:nvPr/>
+          <p:nvPr>
+            <p:ph idx="1"/>
+          </p:nvPr>
         </p:nvPicPr>
         <p:blipFill>
-          <a:blip r:embed="rId2">
-            <a:extLst>
-              <a:ext uri="{28A0092B-C50C-407E-A947-70E740481C1C}">
-                <a14:useLocalDpi xmlns:a14="http://schemas.microsoft.com/office/drawing/2010/main" val="0"/>
-              </a:ext>
-            </a:extLst>
-          </a:blip>
-          <a:srcRect/>
+          <a:blip r:embed="rId2"/>
           <a:stretch>
             <a:fillRect/>
           </a:stretch>
         </p:blipFill>
-        <p:spPr bwMode="auto">
+        <p:spPr>
           <a:xfrm>
-            <a:off x="1328737" y="1825625"/>
-            <a:ext cx="9534525" cy="4324350"/>
+            <a:off x="1626365" y="1271588"/>
+            <a:ext cx="8939270" cy="4905375"/>
           </a:xfrm>
           <a:prstGeom prst="rect">
             <a:avLst/>
           </a:prstGeom>
-          <a:noFill/>
-          <a:extLst>
-            <a:ext uri="{909E8E84-426E-40DD-AFC4-6F175D3DCCD1}">
-              <a14:hiddenFill xmlns:a14="http://schemas.microsoft.com/office/drawing/2010/main">
-                <a:solidFill>
-                  <a:srgbClr val="FFFFFF"/>
-                </a:solidFill>
-              </a14:hiddenFill>
-            </a:ext>
-          </a:extLst>
         </p:spPr>
       </p:pic>
     </p:spTree>
     <p:extLst>
       <p:ext uri="{BB962C8B-B14F-4D97-AF65-F5344CB8AC3E}">
-        <p14:creationId xmlns:p14="http://schemas.microsoft.com/office/powerpoint/2010/main" val="294119901"/>
+        <p14:creationId xmlns:p14="http://schemas.microsoft.com/office/powerpoint/2010/main" val="2930183225"/>
       </p:ext>
     </p:extLst>
   </p:cSld>
@@ -4374,6 +4471,186 @@
           <p:cNvPr id="2" name="Title 1">
             <a:extLst>
               <a:ext uri="{FF2B5EF4-FFF2-40B4-BE49-F238E27FC236}">
+                <a16:creationId xmlns:a16="http://schemas.microsoft.com/office/drawing/2014/main" id="{9DF2043B-824D-45F0-8694-0DF8CE08B671}"/>
+              </a:ext>
+            </a:extLst>
+          </p:cNvPr>
+          <p:cNvSpPr>
+            <a:spLocks noGrp="1"/>
+          </p:cNvSpPr>
+          <p:nvPr>
+            <p:ph type="title"/>
+          </p:nvPr>
+        </p:nvSpPr>
+        <p:spPr/>
+        <p:txBody>
+          <a:bodyPr/>
+          <a:lstStyle/>
+          <a:p>
+            <a:r>
+              <a:rPr lang="en-US" dirty="0"/>
+              <a:t>Visualization - 2</a:t>
+            </a:r>
+          </a:p>
+        </p:txBody>
+      </p:sp>
+      <p:pic>
+        <p:nvPicPr>
+          <p:cNvPr id="4" name="Content Placeholder 3">
+            <a:extLst>
+              <a:ext uri="{FF2B5EF4-FFF2-40B4-BE49-F238E27FC236}">
+                <a16:creationId xmlns:a16="http://schemas.microsoft.com/office/drawing/2014/main" id="{8318CED5-E7AD-4ED2-8F7B-ED0F8608B255}"/>
+              </a:ext>
+            </a:extLst>
+          </p:cNvPr>
+          <p:cNvPicPr>
+            <a:picLocks noGrp="1" noChangeAspect="1"/>
+          </p:cNvPicPr>
+          <p:nvPr>
+            <p:ph idx="1"/>
+          </p:nvPr>
+        </p:nvPicPr>
+        <p:blipFill>
+          <a:blip r:embed="rId2"/>
+          <a:stretch>
+            <a:fillRect/>
+          </a:stretch>
+        </p:blipFill>
+        <p:spPr>
+          <a:xfrm>
+            <a:off x="838200" y="1469250"/>
+            <a:ext cx="10515600" cy="4510050"/>
+          </a:xfrm>
+          <a:prstGeom prst="rect">
+            <a:avLst/>
+          </a:prstGeom>
+        </p:spPr>
+      </p:pic>
+    </p:spTree>
+    <p:extLst>
+      <p:ext uri="{BB962C8B-B14F-4D97-AF65-F5344CB8AC3E}">
+        <p14:creationId xmlns:p14="http://schemas.microsoft.com/office/powerpoint/2010/main" val="1733832944"/>
+      </p:ext>
+    </p:extLst>
+  </p:cSld>
+  <p:clrMapOvr>
+    <a:masterClrMapping/>
+  </p:clrMapOvr>
+</p:sld>
+</file>
+
+<file path=ppt/slides/slide6.xml><?xml version="1.0" encoding="utf-8"?>
+<p:sld xmlns:a="http://schemas.openxmlformats.org/drawingml/2006/main" xmlns:r="http://schemas.openxmlformats.org/officeDocument/2006/relationships" xmlns:p="http://schemas.openxmlformats.org/presentationml/2006/main">
+  <p:cSld>
+    <p:spTree>
+      <p:nvGrpSpPr>
+        <p:cNvPr id="1" name=""/>
+        <p:cNvGrpSpPr/>
+        <p:nvPr/>
+      </p:nvGrpSpPr>
+      <p:grpSpPr>
+        <a:xfrm>
+          <a:off x="0" y="0"/>
+          <a:ext cx="0" cy="0"/>
+          <a:chOff x="0" y="0"/>
+          <a:chExt cx="0" cy="0"/>
+        </a:xfrm>
+      </p:grpSpPr>
+      <p:sp>
+        <p:nvSpPr>
+          <p:cNvPr id="2" name="Title 1">
+            <a:extLst>
+              <a:ext uri="{FF2B5EF4-FFF2-40B4-BE49-F238E27FC236}">
+                <a16:creationId xmlns:a16="http://schemas.microsoft.com/office/drawing/2014/main" id="{2B4C50B4-9BB2-4C4C-9CA9-8B28D089B3E0}"/>
+              </a:ext>
+            </a:extLst>
+          </p:cNvPr>
+          <p:cNvSpPr>
+            <a:spLocks noGrp="1"/>
+          </p:cNvSpPr>
+          <p:nvPr>
+            <p:ph type="title"/>
+          </p:nvPr>
+        </p:nvSpPr>
+        <p:spPr/>
+        <p:txBody>
+          <a:bodyPr/>
+          <a:lstStyle/>
+          <a:p>
+            <a:r>
+              <a:rPr lang="en-US" dirty="0"/>
+              <a:t>Visualization - 3</a:t>
+            </a:r>
+          </a:p>
+        </p:txBody>
+      </p:sp>
+      <p:pic>
+        <p:nvPicPr>
+          <p:cNvPr id="4" name="Content Placeholder 3">
+            <a:extLst>
+              <a:ext uri="{FF2B5EF4-FFF2-40B4-BE49-F238E27FC236}">
+                <a16:creationId xmlns:a16="http://schemas.microsoft.com/office/drawing/2014/main" id="{CDF5F460-3737-4B5F-82B4-427EE63270DA}"/>
+              </a:ext>
+            </a:extLst>
+          </p:cNvPr>
+          <p:cNvPicPr>
+            <a:picLocks noGrp="1" noChangeAspect="1"/>
+          </p:cNvPicPr>
+          <p:nvPr>
+            <p:ph idx="1"/>
+          </p:nvPr>
+        </p:nvPicPr>
+        <p:blipFill>
+          <a:blip r:embed="rId2"/>
+          <a:stretch>
+            <a:fillRect/>
+          </a:stretch>
+        </p:blipFill>
+        <p:spPr>
+          <a:xfrm>
+            <a:off x="961402" y="1271588"/>
+            <a:ext cx="10269196" cy="4905375"/>
+          </a:xfrm>
+          <a:prstGeom prst="rect">
+            <a:avLst/>
+          </a:prstGeom>
+        </p:spPr>
+      </p:pic>
+    </p:spTree>
+    <p:extLst>
+      <p:ext uri="{BB962C8B-B14F-4D97-AF65-F5344CB8AC3E}">
+        <p14:creationId xmlns:p14="http://schemas.microsoft.com/office/powerpoint/2010/main" val="4237952977"/>
+      </p:ext>
+    </p:extLst>
+  </p:cSld>
+  <p:clrMapOvr>
+    <a:masterClrMapping/>
+  </p:clrMapOvr>
+</p:sld>
+</file>
+
+<file path=ppt/slides/slide7.xml><?xml version="1.0" encoding="utf-8"?>
+<p:sld xmlns:a="http://schemas.openxmlformats.org/drawingml/2006/main" xmlns:r="http://schemas.openxmlformats.org/officeDocument/2006/relationships" xmlns:p="http://schemas.openxmlformats.org/presentationml/2006/main">
+  <p:cSld>
+    <p:spTree>
+      <p:nvGrpSpPr>
+        <p:cNvPr id="1" name=""/>
+        <p:cNvGrpSpPr/>
+        <p:nvPr/>
+      </p:nvGrpSpPr>
+      <p:grpSpPr>
+        <a:xfrm>
+          <a:off x="0" y="0"/>
+          <a:ext cx="0" cy="0"/>
+          <a:chOff x="0" y="0"/>
+          <a:chExt cx="0" cy="0"/>
+        </a:xfrm>
+      </p:grpSpPr>
+      <p:sp>
+        <p:nvSpPr>
+          <p:cNvPr id="2" name="Title 1">
+            <a:extLst>
+              <a:ext uri="{FF2B5EF4-FFF2-40B4-BE49-F238E27FC236}">
                 <a16:creationId xmlns:a16="http://schemas.microsoft.com/office/drawing/2014/main" id="{8ED91B4E-C652-4914-9E02-AC18B22356BC}"/>
               </a:ext>
             </a:extLst>
@@ -4415,7 +4692,9 @@
         </p:nvSpPr>
         <p:spPr/>
         <p:txBody>
-          <a:bodyPr/>
+          <a:bodyPr>
+            <a:normAutofit lnSpcReduction="10000"/>
+          </a:bodyPr>
           <a:lstStyle/>
           <a:p>
             <a:r>
@@ -4430,7 +4709,7 @@
             </a:pPr>
             <a:r>
               <a:rPr lang="en-US" dirty="0"/>
-              <a:t>Read csv file from Python</a:t>
+              <a:t>Obtain CSV file from Yahoo finance</a:t>
             </a:r>
           </a:p>
           <a:p>
@@ -4440,13 +4719,24 @@
             </a:pPr>
             <a:r>
               <a:rPr lang="en-US" dirty="0"/>
-              <a:t>Process each line and add it to </a:t>
+              <a:t>Convert csv file to </a:t>
             </a:r>
             <a:r>
               <a:rPr lang="en-US" dirty="0" err="1"/>
-              <a:t>mongodb</a:t>
-            </a:r>
-            <a:endParaRPr lang="en-US" dirty="0"/>
+              <a:t>sqlite</a:t>
+            </a:r>
+            <a:r>
+              <a:rPr lang="en-US" dirty="0"/>
+              <a:t> database file using </a:t>
+            </a:r>
+            <a:r>
+              <a:rPr lang="en-US" dirty="0" err="1"/>
+              <a:t>sqlite</a:t>
+            </a:r>
+            <a:r>
+              <a:rPr lang="en-US" dirty="0"/>
+              <a:t> utility</a:t>
+            </a:r>
           </a:p>
           <a:p>
             <a:pPr marL="514350" indent="-514350">
@@ -4455,13 +4745,15 @@
             </a:pPr>
             <a:r>
               <a:rPr lang="en-US" dirty="0"/>
-              <a:t>Flask + Mongo + Python to deliver JSON content</a:t>
-            </a:r>
-          </a:p>
-          <a:p>
+              <a:t>Use </a:t>
+            </a:r>
+            <a:r>
+              <a:rPr lang="en-US" dirty="0" err="1"/>
+              <a:t>SqlAlchemy</a:t>
+            </a:r>
             <a:r>
               <a:rPr lang="en-US" dirty="0"/>
-              <a:t>Client</a:t>
+              <a:t> to read the database content</a:t>
             </a:r>
           </a:p>
           <a:p>
@@ -4471,7 +4763,21 @@
             </a:pPr>
             <a:r>
               <a:rPr lang="en-US" dirty="0"/>
-              <a:t>Timeline to get the JSON content from server</a:t>
+              <a:t>Flask + </a:t>
+            </a:r>
+            <a:r>
+              <a:rPr lang="en-US" dirty="0" err="1"/>
+              <a:t>Sqlite</a:t>
+            </a:r>
+            <a:r>
+              <a:rPr lang="en-US" dirty="0"/>
+              <a:t> + Python to deliver JSON content</a:t>
+            </a:r>
+          </a:p>
+          <a:p>
+            <a:r>
+              <a:rPr lang="en-US" dirty="0"/>
+              <a:t>Client</a:t>
             </a:r>
           </a:p>
           <a:p>
@@ -4481,7 +4787,7 @@
             </a:pPr>
             <a:r>
               <a:rPr lang="en-US" dirty="0"/>
-              <a:t>Draw the timeline</a:t>
+              <a:t>D3.js to read the JSON content from server</a:t>
             </a:r>
           </a:p>
           <a:p>
@@ -4491,7 +4797,27 @@
             </a:pPr>
             <a:r>
               <a:rPr lang="en-US" dirty="0"/>
-              <a:t>As zoom level changes re-fetch the data from flask and re-draw</a:t>
+              <a:t>Use bootstrap template to place the responsive plots</a:t>
+            </a:r>
+          </a:p>
+          <a:p>
+            <a:pPr marL="514350" indent="-514350">
+              <a:buFont typeface="+mj-lt"/>
+              <a:buAutoNum type="arabicPeriod"/>
+            </a:pPr>
+            <a:r>
+              <a:rPr lang="en-US" dirty="0"/>
+              <a:t>Use Techan.js library to plot the data</a:t>
+            </a:r>
+          </a:p>
+          <a:p>
+            <a:pPr marL="514350" indent="-514350">
+              <a:buFont typeface="+mj-lt"/>
+              <a:buAutoNum type="arabicPeriod"/>
+            </a:pPr>
+            <a:r>
+              <a:rPr lang="en-US" dirty="0"/>
+              <a:t>As window resizes, re-fetch the data from flask and re-draw</a:t>
             </a:r>
           </a:p>
         </p:txBody>

</xml_diff>